<commit_message>
Added sound to powerpoint
</commit_message>
<xml_diff>
--- a/Docs/Präsentation_Kochbuch.pptx
+++ b/Docs/Präsentation_Kochbuch.pptx
@@ -7654,6 +7654,41 @@
           </a:p>
         </p:txBody>
       </p:sp>
+      <p:pic>
+        <p:nvPicPr>
+          <p:cNvPr id="4" name="FFXV Thats it! Ive come up with a new recipe! (mp3cut.net)">
+            <a:hlinkClick r:id="" action="ppaction://media"/>
+          </p:cNvPr>
+          <p:cNvPicPr>
+            <a:picLocks noChangeAspect="1"/>
+          </p:cNvPicPr>
+          <p:nvPr>
+            <a:audioFile r:link="rId2"/>
+            <p:extLst>
+              <p:ext uri="{DAA4B4D4-6D71-4841-9C94-3DE7FCFB9230}">
+                <p14:media xmlns:p14="http://schemas.microsoft.com/office/powerpoint/2010/main" r:embed="rId1">
+                  <p14:fade in="1000"/>
+                </p14:media>
+              </p:ext>
+            </p:extLst>
+          </p:nvPr>
+        </p:nvPicPr>
+        <p:blipFill>
+          <a:blip r:embed="rId4"/>
+          <a:stretch>
+            <a:fillRect/>
+          </a:stretch>
+        </p:blipFill>
+        <p:spPr>
+          <a:xfrm>
+            <a:off x="5892800" y="3225800"/>
+            <a:ext cx="406400" cy="406400"/>
+          </a:xfrm>
+          <a:prstGeom prst="rect">
+            <a:avLst/>
+          </a:prstGeom>
+        </p:spPr>
+      </p:pic>
     </p:spTree>
     <p:extLst>
       <p:ext uri="{BB962C8B-B14F-4D97-AF65-F5344CB8AC3E}">
@@ -7664,6 +7699,93 @@
   <p:clrMapOvr>
     <a:masterClrMapping/>
   </p:clrMapOvr>
+  <p:timing>
+    <p:tnLst>
+      <p:par>
+        <p:cTn id="1" dur="indefinite" restart="never" nodeType="tmRoot">
+          <p:childTnLst>
+            <p:seq concurrent="1" nextAc="seek">
+              <p:cTn id="2" dur="indefinite" nodeType="mainSeq">
+                <p:childTnLst>
+                  <p:par>
+                    <p:cTn id="3" fill="hold">
+                      <p:stCondLst>
+                        <p:cond delay="indefinite"/>
+                        <p:cond evt="onBegin" delay="0">
+                          <p:tn val="2"/>
+                        </p:cond>
+                      </p:stCondLst>
+                      <p:childTnLst>
+                        <p:par>
+                          <p:cTn id="4" fill="hold">
+                            <p:stCondLst>
+                              <p:cond delay="0"/>
+                            </p:stCondLst>
+                            <p:childTnLst>
+                              <p:par>
+                                <p:cTn id="5" presetID="1" presetClass="mediacall" presetSubtype="0" fill="hold" nodeType="afterEffect">
+                                  <p:stCondLst>
+                                    <p:cond delay="0"/>
+                                  </p:stCondLst>
+                                  <p:childTnLst>
+                                    <p:cmd type="call" cmd="playFrom(0.0)">
+                                      <p:cBhvr>
+                                        <p:cTn id="6" dur="3657" fill="hold"/>
+                                        <p:tgtEl>
+                                          <p:spTgt spid="4"/>
+                                        </p:tgtEl>
+                                      </p:cBhvr>
+                                    </p:cmd>
+                                  </p:childTnLst>
+                                </p:cTn>
+                              </p:par>
+                            </p:childTnLst>
+                          </p:cTn>
+                        </p:par>
+                      </p:childTnLst>
+                    </p:cTn>
+                  </p:par>
+                </p:childTnLst>
+              </p:cTn>
+              <p:prevCondLst>
+                <p:cond evt="onPrev" delay="0">
+                  <p:tgtEl>
+                    <p:sldTgt/>
+                  </p:tgtEl>
+                </p:cond>
+              </p:prevCondLst>
+              <p:nextCondLst>
+                <p:cond evt="onNext" delay="0">
+                  <p:tgtEl>
+                    <p:sldTgt/>
+                  </p:tgtEl>
+                </p:cond>
+              </p:nextCondLst>
+            </p:seq>
+            <p:audio>
+              <p:cMediaNode vol="80000" showWhenStopped="0">
+                <p:cTn id="7" fill="hold" display="0">
+                  <p:stCondLst>
+                    <p:cond delay="indefinite"/>
+                  </p:stCondLst>
+                  <p:endCondLst>
+                    <p:cond evt="onStopAudio" delay="0">
+                      <p:tgtEl>
+                        <p:sldTgt/>
+                      </p:tgtEl>
+                    </p:cond>
+                  </p:endCondLst>
+                </p:cTn>
+                <p:tgtEl>
+                  <p:spTgt spid="4"/>
+                </p:tgtEl>
+              </p:cMediaNode>
+            </p:audio>
+          </p:childTnLst>
+        </p:cTn>
+      </p:par>
+    </p:tnLst>
+  </p:timing>
 </p:sld>
 </file>
 
@@ -7702,7 +7824,7 @@
           <a:graphicData uri="http://schemas.openxmlformats.org/presentationml/2006/ole">
             <mc:AlternateContent xmlns:mc="http://schemas.openxmlformats.org/markup-compatibility/2006">
               <mc:Choice xmlns:v="urn:schemas-microsoft-com:vml" Requires="v">
-                <p:oleObj spid="_x0000_s1155" name="Image" r:id="rId3" imgW="4596480" imgH="4583880" progId="Photoshop.Image.16">
+                <p:oleObj spid="_x0000_s1161" name="Image" r:id="rId3" imgW="4596480" imgH="4583880" progId="Photoshop.Image.16">
                   <p:embed/>
                 </p:oleObj>
               </mc:Choice>
@@ -7769,7 +7891,7 @@
             <a:graphicData uri="http://schemas.openxmlformats.org/presentationml/2006/ole">
               <mc:AlternateContent xmlns:mc="http://schemas.openxmlformats.org/markup-compatibility/2006">
                 <mc:Choice xmlns:v="urn:schemas-microsoft-com:vml" Requires="v">
-                  <p:oleObj spid="_x0000_s1156" name="Image" r:id="rId5" imgW="4482360" imgH="4419000" progId="Photoshop.Image.16">
+                  <p:oleObj spid="_x0000_s1162" name="Image" r:id="rId5" imgW="4482360" imgH="4419000" progId="Photoshop.Image.16">
                     <p:embed/>
                   </p:oleObj>
                 </mc:Choice>
@@ -7976,7 +8098,7 @@
             <a:graphicData uri="http://schemas.openxmlformats.org/presentationml/2006/ole">
               <mc:AlternateContent xmlns:mc="http://schemas.openxmlformats.org/markup-compatibility/2006">
                 <mc:Choice xmlns:v="urn:schemas-microsoft-com:vml" Requires="v">
-                  <p:oleObj spid="_x0000_s1157" name="Image" r:id="rId8" imgW="1625040" imgH="1587240" progId="Photoshop.Image.16">
+                  <p:oleObj spid="_x0000_s1163" name="Image" r:id="rId8" imgW="1625040" imgH="1587240" progId="Photoshop.Image.16">
                     <p:embed/>
                   </p:oleObj>
                 </mc:Choice>

</xml_diff>